<commit_message>
fix #27: return the result group by the other account in complex read query 4
</commit_message>
<xml_diff>
--- a/patterns/transaction-read.pptx
+++ b/patterns/transaction-read.pptx
@@ -19508,9 +19508,9 @@
         <p:grpSpPr>
           <a:xfrm>
             <a:off x="2223624" y="1886091"/>
-            <a:ext cx="8540981" cy="4274855"/>
+            <a:ext cx="8540981" cy="3866124"/>
             <a:chOff x="3193443" y="1788676"/>
-            <a:chExt cx="8540981" cy="4274855"/>
+            <a:chExt cx="8540981" cy="3866124"/>
           </a:xfrm>
         </p:grpSpPr>
         <p:sp>
@@ -19975,8 +19975,8 @@
           </p:nvSpPr>
           <p:spPr>
             <a:xfrm>
-              <a:off x="6201822" y="4286232"/>
-              <a:ext cx="2427922" cy="1777299"/>
+              <a:off x="5682812" y="4537863"/>
+              <a:ext cx="3454797" cy="1116937"/>
             </a:xfrm>
             <a:prstGeom prst="rect">
               <a:avLst/>
@@ -20051,7 +20051,47 @@
                   <a:latin typeface="DengXian" panose="02010600030101010101" pitchFamily="2" charset="-122"/>
                   <a:ea typeface="DengXian" panose="02010600030101010101" pitchFamily="2" charset="-122"/>
                 </a:rPr>
-                <a:t>edge1</a:t>
+                <a:t>edge2</a:t>
+              </a:r>
+              <a:r>
+                <a:rPr kumimoji="1" lang="en-US" altLang="zh-CN" sz="1200" dirty="0">
+                  <a:solidFill>
+                    <a:sysClr val="windowText" lastClr="000000"/>
+                  </a:solidFill>
+                  <a:latin typeface="DengXian" panose="02010600030101010101" pitchFamily="2" charset="-122"/>
+                  <a:ea typeface="DengXian" panose="02010600030101010101" pitchFamily="2" charset="-122"/>
+                </a:rPr>
+                <a:t>.amount),</a:t>
+              </a:r>
+              <a:r>
+                <a:rPr kumimoji="1" lang="zh-CN" altLang="en-US" sz="1200" dirty="0">
+                  <a:solidFill>
+                    <a:sysClr val="windowText" lastClr="000000"/>
+                  </a:solidFill>
+                  <a:latin typeface="DengXian" panose="02010600030101010101" pitchFamily="2" charset="-122"/>
+                  <a:ea typeface="DengXian" panose="02010600030101010101" pitchFamily="2" charset="-122"/>
+                </a:rPr>
+                <a:t> </a:t>
+              </a:r>
+              <a:r>
+                <a:rPr kumimoji="1" lang="en-US" altLang="zh-CN" sz="1200" dirty="0">
+                  <a:solidFill>
+                    <a:sysClr val="windowText" lastClr="000000"/>
+                  </a:solidFill>
+                  <a:latin typeface="DengXian" panose="02010600030101010101" pitchFamily="2" charset="-122"/>
+                  <a:ea typeface="DengXian" panose="02010600030101010101" pitchFamily="2" charset="-122"/>
+                </a:rPr>
+                <a:t>MAX(</a:t>
+              </a:r>
+              <a:r>
+                <a:rPr kumimoji="1" lang="en-US" altLang="zh-CN" sz="1200" b="1" i="1" dirty="0">
+                  <a:solidFill>
+                    <a:sysClr val="windowText" lastClr="000000"/>
+                  </a:solidFill>
+                  <a:latin typeface="DengXian" panose="02010600030101010101" pitchFamily="2" charset="-122"/>
+                  <a:ea typeface="DengXian" panose="02010600030101010101" pitchFamily="2" charset="-122"/>
+                </a:rPr>
+                <a:t>edge2</a:t>
               </a:r>
               <a:r>
                 <a:rPr kumimoji="1" lang="en-US" altLang="zh-CN" sz="1200" dirty="0">
@@ -20073,6 +20113,46 @@
                   <a:latin typeface="DengXian" panose="02010600030101010101" pitchFamily="2" charset="-122"/>
                   <a:ea typeface="DengXian" panose="02010600030101010101" pitchFamily="2" charset="-122"/>
                 </a:rPr>
+                <a:t>SUM(</a:t>
+              </a:r>
+              <a:r>
+                <a:rPr kumimoji="1" lang="en-US" altLang="zh-CN" sz="1200" b="1" i="1" dirty="0">
+                  <a:solidFill>
+                    <a:sysClr val="windowText" lastClr="000000"/>
+                  </a:solidFill>
+                  <a:latin typeface="DengXian" panose="02010600030101010101" pitchFamily="2" charset="-122"/>
+                  <a:ea typeface="DengXian" panose="02010600030101010101" pitchFamily="2" charset="-122"/>
+                </a:rPr>
+                <a:t>edge3</a:t>
+              </a:r>
+              <a:r>
+                <a:rPr kumimoji="1" lang="en-US" altLang="zh-CN" sz="1200" dirty="0">
+                  <a:solidFill>
+                    <a:sysClr val="windowText" lastClr="000000"/>
+                  </a:solidFill>
+                  <a:latin typeface="DengXian" panose="02010600030101010101" pitchFamily="2" charset="-122"/>
+                  <a:ea typeface="DengXian" panose="02010600030101010101" pitchFamily="2" charset="-122"/>
+                </a:rPr>
+                <a:t>.amount),</a:t>
+              </a:r>
+              <a:r>
+                <a:rPr kumimoji="1" lang="zh-CN" altLang="en-US" sz="1200" dirty="0">
+                  <a:solidFill>
+                    <a:sysClr val="windowText" lastClr="000000"/>
+                  </a:solidFill>
+                  <a:latin typeface="DengXian" panose="02010600030101010101" pitchFamily="2" charset="-122"/>
+                  <a:ea typeface="DengXian" panose="02010600030101010101" pitchFamily="2" charset="-122"/>
+                </a:rPr>
+                <a:t> </a:t>
+              </a:r>
+              <a:r>
+                <a:rPr kumimoji="1" lang="en-US" altLang="zh-CN" sz="1200" dirty="0">
+                  <a:solidFill>
+                    <a:sysClr val="windowText" lastClr="000000"/>
+                  </a:solidFill>
+                  <a:latin typeface="DengXian" panose="02010600030101010101" pitchFamily="2" charset="-122"/>
+                  <a:ea typeface="DengXian" panose="02010600030101010101" pitchFamily="2" charset="-122"/>
+                </a:rPr>
                 <a:t>MAX(</a:t>
               </a:r>
               <a:r>
@@ -20083,7 +20163,7 @@
                   <a:latin typeface="DengXian" panose="02010600030101010101" pitchFamily="2" charset="-122"/>
                   <a:ea typeface="DengXian" panose="02010600030101010101" pitchFamily="2" charset="-122"/>
                 </a:rPr>
-                <a:t>edge1</a:t>
+                <a:t>edge3</a:t>
               </a:r>
               <a:r>
                 <a:rPr kumimoji="1" lang="en-US" altLang="zh-CN" sz="1200" dirty="0">
@@ -20098,144 +20178,25 @@
             </a:p>
             <a:p>
               <a:r>
-                <a:rPr kumimoji="1" lang="en-US" altLang="zh-CN" sz="1200" dirty="0">
-                  <a:solidFill>
-                    <a:sysClr val="windowText" lastClr="000000"/>
-                  </a:solidFill>
-                  <a:latin typeface="DengXian" panose="02010600030101010101" pitchFamily="2" charset="-122"/>
-                  <a:ea typeface="DengXian" panose="02010600030101010101" pitchFamily="2" charset="-122"/>
-                </a:rPr>
-                <a:t>SUM(</a:t>
-              </a:r>
-              <a:r>
-                <a:rPr kumimoji="1" lang="en-US" altLang="zh-CN" sz="1200" b="1" i="1" dirty="0">
-                  <a:solidFill>
-                    <a:sysClr val="windowText" lastClr="000000"/>
-                  </a:solidFill>
-                  <a:latin typeface="DengXian" panose="02010600030101010101" pitchFamily="2" charset="-122"/>
-                  <a:ea typeface="DengXian" panose="02010600030101010101" pitchFamily="2" charset="-122"/>
-                </a:rPr>
-                <a:t>edge2</a:t>
-              </a:r>
-              <a:r>
-                <a:rPr kumimoji="1" lang="en-US" altLang="zh-CN" sz="1200" dirty="0">
-                  <a:solidFill>
-                    <a:sysClr val="windowText" lastClr="000000"/>
-                  </a:solidFill>
-                  <a:latin typeface="DengXian" panose="02010600030101010101" pitchFamily="2" charset="-122"/>
-                  <a:ea typeface="DengXian" panose="02010600030101010101" pitchFamily="2" charset="-122"/>
-                </a:rPr>
-                <a:t>.amount)</a:t>
-              </a:r>
+                <a:rPr kumimoji="1" lang="en-US" altLang="zh-CN" sz="1200" b="1" dirty="0" err="1">
+                  <a:solidFill>
+                    <a:sysClr val="windowText" lastClr="000000"/>
+                  </a:solidFill>
+                  <a:latin typeface="DengXian" panose="02010600030101010101" pitchFamily="2" charset="-122"/>
+                  <a:ea typeface="DengXian" panose="02010600030101010101" pitchFamily="2" charset="-122"/>
+                </a:rPr>
+                <a:t>GroupBy</a:t>
+              </a:r>
+              <a:endParaRPr kumimoji="1" lang="en-US" altLang="zh-CN" sz="1200" b="1" dirty="0">
+                <a:solidFill>
+                  <a:sysClr val="windowText" lastClr="000000"/>
+                </a:solidFill>
+                <a:latin typeface="DengXian" panose="02010600030101010101" pitchFamily="2" charset="-122"/>
+                <a:ea typeface="DengXian" panose="02010600030101010101" pitchFamily="2" charset="-122"/>
+              </a:endParaRPr>
             </a:p>
             <a:p>
               <a:r>
-                <a:rPr kumimoji="1" lang="en-US" altLang="zh-CN" sz="1200" dirty="0">
-                  <a:solidFill>
-                    <a:sysClr val="windowText" lastClr="000000"/>
-                  </a:solidFill>
-                  <a:latin typeface="DengXian" panose="02010600030101010101" pitchFamily="2" charset="-122"/>
-                  <a:ea typeface="DengXian" panose="02010600030101010101" pitchFamily="2" charset="-122"/>
-                </a:rPr>
-                <a:t>MAX(</a:t>
-              </a:r>
-              <a:r>
-                <a:rPr kumimoji="1" lang="en-US" altLang="zh-CN" sz="1200" b="1" i="1" dirty="0">
-                  <a:solidFill>
-                    <a:sysClr val="windowText" lastClr="000000"/>
-                  </a:solidFill>
-                  <a:latin typeface="DengXian" panose="02010600030101010101" pitchFamily="2" charset="-122"/>
-                  <a:ea typeface="DengXian" panose="02010600030101010101" pitchFamily="2" charset="-122"/>
-                </a:rPr>
-                <a:t>edge2</a:t>
-              </a:r>
-              <a:r>
-                <a:rPr kumimoji="1" lang="en-US" altLang="zh-CN" sz="1200" dirty="0">
-                  <a:solidFill>
-                    <a:sysClr val="windowText" lastClr="000000"/>
-                  </a:solidFill>
-                  <a:latin typeface="DengXian" panose="02010600030101010101" pitchFamily="2" charset="-122"/>
-                  <a:ea typeface="DengXian" panose="02010600030101010101" pitchFamily="2" charset="-122"/>
-                </a:rPr>
-                <a:t>.amount)</a:t>
-              </a:r>
-            </a:p>
-            <a:p>
-              <a:r>
-                <a:rPr kumimoji="1" lang="en-US" altLang="zh-CN" sz="1200" dirty="0">
-                  <a:solidFill>
-                    <a:sysClr val="windowText" lastClr="000000"/>
-                  </a:solidFill>
-                  <a:latin typeface="DengXian" panose="02010600030101010101" pitchFamily="2" charset="-122"/>
-                  <a:ea typeface="DengXian" panose="02010600030101010101" pitchFamily="2" charset="-122"/>
-                </a:rPr>
-                <a:t>SUM(</a:t>
-              </a:r>
-              <a:r>
-                <a:rPr kumimoji="1" lang="en-US" altLang="zh-CN" sz="1200" b="1" i="1" dirty="0">
-                  <a:solidFill>
-                    <a:sysClr val="windowText" lastClr="000000"/>
-                  </a:solidFill>
-                  <a:latin typeface="DengXian" panose="02010600030101010101" pitchFamily="2" charset="-122"/>
-                  <a:ea typeface="DengXian" panose="02010600030101010101" pitchFamily="2" charset="-122"/>
-                </a:rPr>
-                <a:t>edge3</a:t>
-              </a:r>
-              <a:r>
-                <a:rPr kumimoji="1" lang="en-US" altLang="zh-CN" sz="1200" dirty="0">
-                  <a:solidFill>
-                    <a:sysClr val="windowText" lastClr="000000"/>
-                  </a:solidFill>
-                  <a:latin typeface="DengXian" panose="02010600030101010101" pitchFamily="2" charset="-122"/>
-                  <a:ea typeface="DengXian" panose="02010600030101010101" pitchFamily="2" charset="-122"/>
-                </a:rPr>
-                <a:t>.amount)</a:t>
-              </a:r>
-            </a:p>
-            <a:p>
-              <a:r>
-                <a:rPr kumimoji="1" lang="en-US" altLang="zh-CN" sz="1200" dirty="0">
-                  <a:solidFill>
-                    <a:sysClr val="windowText" lastClr="000000"/>
-                  </a:solidFill>
-                  <a:latin typeface="DengXian" panose="02010600030101010101" pitchFamily="2" charset="-122"/>
-                  <a:ea typeface="DengXian" panose="02010600030101010101" pitchFamily="2" charset="-122"/>
-                </a:rPr>
-                <a:t>MAX(</a:t>
-              </a:r>
-              <a:r>
-                <a:rPr kumimoji="1" lang="en-US" altLang="zh-CN" sz="1200" b="1" i="1" dirty="0">
-                  <a:solidFill>
-                    <a:sysClr val="windowText" lastClr="000000"/>
-                  </a:solidFill>
-                  <a:latin typeface="DengXian" panose="02010600030101010101" pitchFamily="2" charset="-122"/>
-                  <a:ea typeface="DengXian" panose="02010600030101010101" pitchFamily="2" charset="-122"/>
-                </a:rPr>
-                <a:t>edge3</a:t>
-              </a:r>
-              <a:r>
-                <a:rPr kumimoji="1" lang="en-US" altLang="zh-CN" sz="1200" dirty="0">
-                  <a:solidFill>
-                    <a:sysClr val="windowText" lastClr="000000"/>
-                  </a:solidFill>
-                  <a:latin typeface="DengXian" panose="02010600030101010101" pitchFamily="2" charset="-122"/>
-                  <a:ea typeface="DengXian" panose="02010600030101010101" pitchFamily="2" charset="-122"/>
-                </a:rPr>
-                <a:t>.amount)</a:t>
-              </a:r>
-            </a:p>
-            <a:p>
-              <a:r>
-                <a:rPr kumimoji="1" lang="en-US" altLang="zh-CN" sz="1200" dirty="0">
-                  <a:solidFill>
-                    <a:sysClr val="windowText" lastClr="000000"/>
-                  </a:solidFill>
-                  <a:latin typeface="DengXian" panose="02010600030101010101" pitchFamily="2" charset="-122"/>
-                  <a:ea typeface="DengXian" panose="02010600030101010101" pitchFamily="2" charset="-122"/>
-                </a:rPr>
-                <a:t>COUNT(DISTINCT </a:t>
-              </a:r>
-              <a:r>
                 <a:rPr kumimoji="1" lang="en-US" altLang="zh-CN" sz="1200" b="1" i="1" dirty="0" err="1">
                   <a:solidFill>
                     <a:sysClr val="windowText" lastClr="000000"/>
@@ -20243,18 +20204,15 @@
                   <a:latin typeface="DengXian" panose="02010600030101010101" pitchFamily="2" charset="-122"/>
                   <a:ea typeface="DengXian" panose="02010600030101010101" pitchFamily="2" charset="-122"/>
                 </a:rPr>
-                <a:t>otherAccounts</a:t>
-              </a:r>
-              <a:r>
-                <a:rPr kumimoji="1" lang="en-US" altLang="zh-CN" sz="1200" dirty="0">
-                  <a:solidFill>
-                    <a:sysClr val="windowText" lastClr="000000"/>
-                  </a:solidFill>
-                  <a:latin typeface="DengXian" panose="02010600030101010101" pitchFamily="2" charset="-122"/>
-                  <a:ea typeface="DengXian" panose="02010600030101010101" pitchFamily="2" charset="-122"/>
-                </a:rPr>
-                <a:t>)</a:t>
-              </a:r>
+                <a:t>otherAccounts.id</a:t>
+              </a:r>
+              <a:endParaRPr kumimoji="1" lang="en-US" altLang="zh-CN" sz="1200" b="1" i="1" dirty="0">
+                <a:solidFill>
+                  <a:sysClr val="windowText" lastClr="000000"/>
+                </a:solidFill>
+                <a:latin typeface="DengXian" panose="02010600030101010101" pitchFamily="2" charset="-122"/>
+                <a:ea typeface="DengXian" panose="02010600030101010101" pitchFamily="2" charset="-122"/>
+              </a:endParaRPr>
             </a:p>
           </p:txBody>
         </p:sp>

</xml_diff>